<commit_message>
Hank's pass at 1.1.1
</commit_message>
<xml_diff>
--- a/images/ascent_actions_diagram.pptx
+++ b/images/ascent_actions_diagram.pptx
@@ -3519,16 +3519,56 @@
           <a:chExt cx="0" cy="0"/>
         </a:xfrm>
       </p:grpSpPr>
-      <p:sp>
-        <p:nvSpPr>
-          <p:cNvPr id="52" name="Rounded Rectangle 51"/>
+      <p:cxnSp>
+        <p:nvCxnSpPr>
+          <p:cNvPr id="58" name="Straight Arrow Connector 57"/>
+          <p:cNvCxnSpPr/>
+          <p:nvPr/>
+        </p:nvCxnSpPr>
+        <p:spPr>
+          <a:xfrm>
+            <a:off x="2227932" y="2396047"/>
+            <a:ext cx="710482" cy="457391"/>
+          </a:xfrm>
+          <a:prstGeom prst="straightConnector1">
+            <a:avLst/>
+          </a:prstGeom>
+          <a:ln w="47625" cmpd="sng">
+            <a:solidFill>
+              <a:schemeClr val="accent1">
+                <a:lumMod val="75000"/>
+              </a:schemeClr>
+            </a:solidFill>
+            <a:headEnd w="lg" len="med"/>
+            <a:tailEnd type="triangle" w="lg" len="med"/>
+          </a:ln>
+          <a:effectLst/>
+        </p:spPr>
+        <p:style>
+          <a:lnRef idx="2">
+            <a:schemeClr val="accent1"/>
+          </a:lnRef>
+          <a:fillRef idx="0">
+            <a:schemeClr val="accent1"/>
+          </a:fillRef>
+          <a:effectRef idx="1">
+            <a:schemeClr val="accent1"/>
+          </a:effectRef>
+          <a:fontRef idx="minor">
+            <a:schemeClr val="tx1"/>
+          </a:fontRef>
+        </p:style>
+      </p:cxnSp>
+      <p:sp>
+        <p:nvSpPr>
+          <p:cNvPr id="49" name="Rounded Rectangle 48"/>
           <p:cNvSpPr/>
           <p:nvPr/>
         </p:nvSpPr>
         <p:spPr>
           <a:xfrm>
-            <a:off x="2818680" y="1106823"/>
-            <a:ext cx="5026860" cy="2448783"/>
+            <a:off x="2765944" y="129508"/>
+            <a:ext cx="5026860" cy="2127071"/>
           </a:xfrm>
           <a:prstGeom prst="roundRect">
             <a:avLst>
@@ -3583,6 +3623,70 @@
           </a:p>
         </p:txBody>
       </p:sp>
+      <p:sp>
+        <p:nvSpPr>
+          <p:cNvPr id="52" name="Rounded Rectangle 51"/>
+          <p:cNvSpPr/>
+          <p:nvPr/>
+        </p:nvSpPr>
+        <p:spPr>
+          <a:xfrm>
+            <a:off x="2775467" y="2329552"/>
+            <a:ext cx="5026860" cy="2127071"/>
+          </a:xfrm>
+          <a:prstGeom prst="roundRect">
+            <a:avLst>
+              <a:gd name="adj" fmla="val 4754"/>
+            </a:avLst>
+          </a:prstGeom>
+          <a:solidFill>
+            <a:schemeClr val="accent4">
+              <a:lumMod val="40000"/>
+              <a:lumOff val="60000"/>
+            </a:schemeClr>
+          </a:solidFill>
+          <a:ln w="19050" cap="flat" cmpd="sng" algn="ctr">
+            <a:solidFill>
+              <a:schemeClr val="tx1">
+                <a:lumMod val="50000"/>
+                <a:lumOff val="50000"/>
+              </a:schemeClr>
+            </a:solidFill>
+            <a:prstDash val="solid"/>
+          </a:ln>
+          <a:effectLst/>
+        </p:spPr>
+        <p:txBody>
+          <a:bodyPr lIns="91416" tIns="91416" bIns="91416" rtlCol="0" anchor="ctr" anchorCtr="0"/>
+          <a:lstStyle/>
+          <a:p>
+            <a:pPr algn="ctr" defTabSz="914171">
+              <a:defRPr/>
+            </a:pPr>
+            <a:endParaRPr lang="en-US" sz="2666" b="1" kern="0" dirty="0">
+              <a:solidFill>
+                <a:sysClr val="windowText" lastClr="000000"/>
+              </a:solidFill>
+              <a:latin typeface="Calibri" charset="0"/>
+              <a:ea typeface="Calibri" charset="0"/>
+              <a:cs typeface="Calibri" charset="0"/>
+            </a:endParaRPr>
+          </a:p>
+          <a:p>
+            <a:pPr algn="ctr" defTabSz="914171">
+              <a:defRPr/>
+            </a:pPr>
+            <a:endParaRPr lang="en-US" sz="2666" b="1" kern="0" dirty="0">
+              <a:solidFill>
+                <a:sysClr val="windowText" lastClr="000000"/>
+              </a:solidFill>
+              <a:latin typeface="Calibri" charset="0"/>
+              <a:ea typeface="Calibri" charset="0"/>
+              <a:cs typeface="Calibri" charset="0"/>
+            </a:endParaRPr>
+          </a:p>
+        </p:txBody>
+      </p:sp>
       <p:pic>
         <p:nvPicPr>
           <p:cNvPr id="16" name="Picture 15"/>
@@ -3605,7 +3709,7 @@
         </p:blipFill>
         <p:spPr>
           <a:xfrm>
-            <a:off x="513094" y="1188110"/>
+            <a:off x="317473" y="1193043"/>
             <a:ext cx="1844540" cy="1780567"/>
           </a:xfrm>
           <a:prstGeom prst="rect">
@@ -3621,7 +3725,7 @@
         </p:nvSpPr>
         <p:spPr>
           <a:xfrm>
-            <a:off x="260277" y="2963438"/>
+            <a:off x="64656" y="2968371"/>
             <a:ext cx="2350181" cy="912814"/>
           </a:xfrm>
           <a:prstGeom prst="rect">
@@ -3666,7 +3770,7 @@
         </p:nvSpPr>
         <p:spPr>
           <a:xfrm>
-            <a:off x="5884605" y="2872061"/>
+            <a:off x="5846217" y="3752521"/>
             <a:ext cx="1741288" cy="420564"/>
           </a:xfrm>
           <a:prstGeom prst="rect">
@@ -3700,7 +3804,7 @@
         </p:nvSpPr>
         <p:spPr>
           <a:xfrm>
-            <a:off x="3213500" y="2890024"/>
+            <a:off x="2885331" y="3772843"/>
             <a:ext cx="1741288" cy="420564"/>
           </a:xfrm>
           <a:prstGeom prst="rect">
@@ -3734,7 +3838,7 @@
         </p:nvSpPr>
         <p:spPr>
           <a:xfrm>
-            <a:off x="2818679" y="1106823"/>
+            <a:off x="2815052" y="3915469"/>
             <a:ext cx="5026860" cy="502573"/>
           </a:xfrm>
           <a:prstGeom prst="rect">
@@ -3750,13 +3854,18 @@
           <a:p>
             <a:pPr algn="ctr"/>
             <a:r>
-              <a:rPr lang="en-US" sz="2666" dirty="0">
+              <a:rPr lang="en-US" sz="2666" dirty="0" smtClean="0">
                 <a:latin typeface="Calibri" charset="0"/>
                 <a:ea typeface="Calibri" charset="0"/>
                 <a:cs typeface="Calibri" charset="0"/>
               </a:rPr>
-              <a:t>Pipeline</a:t>
-            </a:r>
+              <a:t>Pipeline #2</a:t>
+            </a:r>
+            <a:endParaRPr lang="en-US" sz="2666" dirty="0">
+              <a:latin typeface="Calibri" charset="0"/>
+              <a:ea typeface="Calibri" charset="0"/>
+              <a:cs typeface="Calibri" charset="0"/>
+            </a:endParaRPr>
           </a:p>
         </p:txBody>
       </p:sp>
@@ -3764,15 +3873,14 @@
         <p:nvCxnSpPr>
           <p:cNvPr id="48" name="Straight Arrow Connector 47"/>
           <p:cNvCxnSpPr>
-            <a:stCxn id="52" idx="3"/>
             <a:endCxn id="53" idx="1"/>
           </p:cNvCxnSpPr>
           <p:nvPr/>
         </p:nvCxnSpPr>
         <p:spPr>
-          <a:xfrm flipV="1">
-            <a:off x="7845540" y="2317098"/>
-            <a:ext cx="808620" cy="14117"/>
+          <a:xfrm>
+            <a:off x="8246545" y="2316310"/>
+            <a:ext cx="407615" cy="788"/>
           </a:xfrm>
           <a:prstGeom prst="straightConnector1">
             <a:avLst/>
@@ -3835,7 +3943,7 @@
         </p:blipFill>
         <p:spPr>
           <a:xfrm>
-            <a:off x="3135488" y="1563186"/>
+            <a:off x="2979511" y="2433508"/>
             <a:ext cx="1552929" cy="1455871"/>
           </a:xfrm>
           <a:prstGeom prst="rect">
@@ -3875,7 +3983,7 @@
         </p:blipFill>
         <p:spPr>
           <a:xfrm>
-            <a:off x="6286097" y="1555867"/>
+            <a:off x="6247709" y="2436327"/>
             <a:ext cx="929939" cy="1371204"/>
           </a:xfrm>
           <a:prstGeom prst="rect">
@@ -4587,7 +4695,7 @@
         </p:nvCxnSpPr>
         <p:spPr>
           <a:xfrm>
-            <a:off x="4980685" y="2286949"/>
+            <a:off x="4942297" y="3167409"/>
             <a:ext cx="992178" cy="0"/>
           </a:xfrm>
           <a:prstGeom prst="straightConnector1">
@@ -4627,8 +4735,8 @@
         </p:nvCxnSpPr>
         <p:spPr>
           <a:xfrm flipV="1">
-            <a:off x="2075532" y="2238739"/>
-            <a:ext cx="1021039" cy="4907"/>
+            <a:off x="2075532" y="1744171"/>
+            <a:ext cx="845321" cy="499476"/>
           </a:xfrm>
           <a:prstGeom prst="straightConnector1">
             <a:avLst/>
@@ -4667,8 +4775,8 @@
         </p:nvSpPr>
         <p:spPr>
           <a:xfrm>
-            <a:off x="1858842" y="1955900"/>
-            <a:ext cx="850017" cy="565677"/>
+            <a:off x="1335317" y="1740931"/>
+            <a:ext cx="1177922" cy="785579"/>
           </a:xfrm>
           <a:prstGeom prst="flowChartMagneticDisk">
             <a:avLst/>
@@ -4697,7 +4805,7 @@
               <a:defRPr/>
             </a:pPr>
             <a:r>
-              <a:rPr lang="en-US" sz="1200" b="1" kern="0" dirty="0">
+              <a:rPr lang="en-US" b="1" kern="0" dirty="0">
                 <a:solidFill>
                   <a:sysClr val="windowText" lastClr="000000"/>
                 </a:solidFill>
@@ -4713,7 +4821,7 @@
               <a:defRPr/>
             </a:pPr>
             <a:r>
-              <a:rPr lang="en-US" sz="1200" b="1" kern="0" dirty="0">
+              <a:rPr lang="en-US" b="1" kern="0" dirty="0">
                 <a:solidFill>
                   <a:sysClr val="windowText" lastClr="000000"/>
                 </a:solidFill>
@@ -4729,16 +4837,13 @@
       <p:cxnSp>
         <p:nvCxnSpPr>
           <p:cNvPr id="36" name="Elbow Connector 35"/>
-          <p:cNvCxnSpPr>
-            <a:stCxn id="52" idx="3"/>
-            <a:endCxn id="50" idx="1"/>
-          </p:cNvCxnSpPr>
+          <p:cNvCxnSpPr/>
           <p:nvPr/>
         </p:nvCxnSpPr>
         <p:spPr>
           <a:xfrm flipV="1">
-            <a:off x="7845540" y="633639"/>
-            <a:ext cx="827707" cy="1697576"/>
+            <a:off x="7810647" y="723126"/>
+            <a:ext cx="871796" cy="2632113"/>
           </a:xfrm>
           <a:prstGeom prst="bentConnector3">
             <a:avLst>
@@ -4774,20 +4879,17 @@
       <p:cxnSp>
         <p:nvCxnSpPr>
           <p:cNvPr id="40" name="Elbow Connector 39"/>
-          <p:cNvCxnSpPr>
-            <a:stCxn id="52" idx="3"/>
-            <a:endCxn id="55" idx="1"/>
-          </p:cNvCxnSpPr>
+          <p:cNvCxnSpPr/>
           <p:nvPr/>
         </p:nvCxnSpPr>
         <p:spPr>
           <a:xfrm>
-            <a:off x="7845540" y="2331215"/>
-            <a:ext cx="829316" cy="1426635"/>
+            <a:off x="7791102" y="3371191"/>
+            <a:ext cx="873405" cy="492098"/>
           </a:xfrm>
           <a:prstGeom prst="bentConnector3">
             <a:avLst>
-              <a:gd name="adj1" fmla="val 50000"/>
+              <a:gd name="adj1" fmla="val 52181"/>
             </a:avLst>
           </a:prstGeom>
           <a:ln w="47625" cmpd="sng">
@@ -4816,6 +4918,124 @@
           </a:fontRef>
         </p:style>
       </p:cxnSp>
+      <p:sp>
+        <p:nvSpPr>
+          <p:cNvPr id="51" name="TextBox 50"/>
+          <p:cNvSpPr txBox="1"/>
+          <p:nvPr/>
+        </p:nvSpPr>
+        <p:spPr>
+          <a:xfrm>
+            <a:off x="2805530" y="1679119"/>
+            <a:ext cx="5026860" cy="502573"/>
+          </a:xfrm>
+          <a:prstGeom prst="rect">
+            <a:avLst/>
+          </a:prstGeom>
+          <a:noFill/>
+        </p:spPr>
+        <p:txBody>
+          <a:bodyPr wrap="square" rtlCol="0">
+            <a:spAutoFit/>
+          </a:bodyPr>
+          <a:lstStyle/>
+          <a:p>
+            <a:pPr algn="ctr"/>
+            <a:r>
+              <a:rPr lang="en-US" sz="2666" dirty="0" smtClean="0">
+                <a:latin typeface="Calibri" charset="0"/>
+                <a:ea typeface="Calibri" charset="0"/>
+                <a:cs typeface="Calibri" charset="0"/>
+              </a:rPr>
+              <a:t>Pipeline #1</a:t>
+            </a:r>
+            <a:endParaRPr lang="en-US" sz="2666" dirty="0">
+              <a:latin typeface="Calibri" charset="0"/>
+              <a:ea typeface="Calibri" charset="0"/>
+              <a:cs typeface="Calibri" charset="0"/>
+            </a:endParaRPr>
+          </a:p>
+        </p:txBody>
+      </p:sp>
+      <p:cxnSp>
+        <p:nvCxnSpPr>
+          <p:cNvPr id="34" name="Straight Arrow Connector 33"/>
+          <p:cNvCxnSpPr/>
+          <p:nvPr/>
+        </p:nvCxnSpPr>
+        <p:spPr>
+          <a:xfrm>
+            <a:off x="7791102" y="447535"/>
+            <a:ext cx="891341" cy="4577"/>
+          </a:xfrm>
+          <a:prstGeom prst="straightConnector1">
+            <a:avLst/>
+          </a:prstGeom>
+          <a:ln w="47625" cmpd="sng">
+            <a:solidFill>
+              <a:schemeClr val="accent1">
+                <a:lumMod val="75000"/>
+              </a:schemeClr>
+            </a:solidFill>
+            <a:headEnd w="lg" len="med"/>
+            <a:tailEnd type="triangle" w="lg" len="med"/>
+          </a:ln>
+          <a:effectLst/>
+        </p:spPr>
+        <p:style>
+          <a:lnRef idx="2">
+            <a:schemeClr val="accent1"/>
+          </a:lnRef>
+          <a:fillRef idx="0">
+            <a:schemeClr val="accent1"/>
+          </a:fillRef>
+          <a:effectRef idx="1">
+            <a:schemeClr val="accent1"/>
+          </a:effectRef>
+          <a:fontRef idx="minor">
+            <a:schemeClr val="tx1"/>
+          </a:fontRef>
+        </p:style>
+      </p:cxnSp>
+      <p:sp>
+        <p:nvSpPr>
+          <p:cNvPr id="37" name="TextBox 36"/>
+          <p:cNvSpPr txBox="1"/>
+          <p:nvPr/>
+        </p:nvSpPr>
+        <p:spPr>
+          <a:xfrm>
+            <a:off x="4407879" y="162466"/>
+            <a:ext cx="1741288" cy="420564"/>
+          </a:xfrm>
+          <a:prstGeom prst="rect">
+            <a:avLst/>
+          </a:prstGeom>
+          <a:noFill/>
+        </p:spPr>
+        <p:txBody>
+          <a:bodyPr wrap="square" rtlCol="0">
+            <a:spAutoFit/>
+          </a:bodyPr>
+          <a:lstStyle/>
+          <a:p>
+            <a:pPr algn="ctr"/>
+            <a:r>
+              <a:rPr lang="en-US" sz="2133" dirty="0" smtClean="0">
+                <a:latin typeface="Calibri" charset="0"/>
+                <a:ea typeface="Calibri" charset="0"/>
+                <a:cs typeface="Calibri" charset="0"/>
+              </a:rPr>
+              <a:t>contour</a:t>
+            </a:r>
+            <a:endParaRPr lang="en-US" sz="2133" dirty="0">
+              <a:latin typeface="Calibri" charset="0"/>
+              <a:ea typeface="Calibri" charset="0"/>
+              <a:cs typeface="Calibri" charset="0"/>
+            </a:endParaRPr>
+          </a:p>
+        </p:txBody>
+      </p:sp>
     </p:spTree>
     <p:extLst>
       <p:ext uri="{BB962C8B-B14F-4D97-AF65-F5344CB8AC3E}">

</xml_diff>